<commit_message>
Atualização do prototipo exploratorio
</commit_message>
<xml_diff>
--- a/Prototipo Exploratório e fotos/prototipoexploratorio.pptx
+++ b/Prototipo Exploratório e fotos/prototipoexploratorio.pptx
@@ -274,7 +274,7 @@
           <a:p>
             <a:fld id="{8A106747-A151-4651-9568-54DB89D494C1}" type="datetimeFigureOut">
               <a:rPr lang="pt-PT" smtClean="0"/>
-              <a:t>11/04/2014</a:t>
+              <a:t>15/04/2014</a:t>
             </a:fld>
             <a:endParaRPr lang="pt-PT"/>
           </a:p>
@@ -444,7 +444,7 @@
           <a:p>
             <a:fld id="{8A106747-A151-4651-9568-54DB89D494C1}" type="datetimeFigureOut">
               <a:rPr lang="pt-PT" smtClean="0"/>
-              <a:t>11/04/2014</a:t>
+              <a:t>15/04/2014</a:t>
             </a:fld>
             <a:endParaRPr lang="pt-PT"/>
           </a:p>
@@ -624,7 +624,7 @@
           <a:p>
             <a:fld id="{8A106747-A151-4651-9568-54DB89D494C1}" type="datetimeFigureOut">
               <a:rPr lang="pt-PT" smtClean="0"/>
-              <a:t>11/04/2014</a:t>
+              <a:t>15/04/2014</a:t>
             </a:fld>
             <a:endParaRPr lang="pt-PT"/>
           </a:p>
@@ -794,7 +794,7 @@
           <a:p>
             <a:fld id="{8A106747-A151-4651-9568-54DB89D494C1}" type="datetimeFigureOut">
               <a:rPr lang="pt-PT" smtClean="0"/>
-              <a:t>11/04/2014</a:t>
+              <a:t>15/04/2014</a:t>
             </a:fld>
             <a:endParaRPr lang="pt-PT"/>
           </a:p>
@@ -1040,7 +1040,7 @@
           <a:p>
             <a:fld id="{8A106747-A151-4651-9568-54DB89D494C1}" type="datetimeFigureOut">
               <a:rPr lang="pt-PT" smtClean="0"/>
-              <a:t>11/04/2014</a:t>
+              <a:t>15/04/2014</a:t>
             </a:fld>
             <a:endParaRPr lang="pt-PT"/>
           </a:p>
@@ -1272,7 +1272,7 @@
           <a:p>
             <a:fld id="{8A106747-A151-4651-9568-54DB89D494C1}" type="datetimeFigureOut">
               <a:rPr lang="pt-PT" smtClean="0"/>
-              <a:t>11/04/2014</a:t>
+              <a:t>15/04/2014</a:t>
             </a:fld>
             <a:endParaRPr lang="pt-PT"/>
           </a:p>
@@ -1639,7 +1639,7 @@
           <a:p>
             <a:fld id="{8A106747-A151-4651-9568-54DB89D494C1}" type="datetimeFigureOut">
               <a:rPr lang="pt-PT" smtClean="0"/>
-              <a:t>11/04/2014</a:t>
+              <a:t>15/04/2014</a:t>
             </a:fld>
             <a:endParaRPr lang="pt-PT"/>
           </a:p>
@@ -1757,7 +1757,7 @@
           <a:p>
             <a:fld id="{8A106747-A151-4651-9568-54DB89D494C1}" type="datetimeFigureOut">
               <a:rPr lang="pt-PT" smtClean="0"/>
-              <a:t>11/04/2014</a:t>
+              <a:t>15/04/2014</a:t>
             </a:fld>
             <a:endParaRPr lang="pt-PT"/>
           </a:p>
@@ -1852,7 +1852,7 @@
           <a:p>
             <a:fld id="{8A106747-A151-4651-9568-54DB89D494C1}" type="datetimeFigureOut">
               <a:rPr lang="pt-PT" smtClean="0"/>
-              <a:t>11/04/2014</a:t>
+              <a:t>15/04/2014</a:t>
             </a:fld>
             <a:endParaRPr lang="pt-PT"/>
           </a:p>
@@ -2129,7 +2129,7 @@
           <a:p>
             <a:fld id="{8A106747-A151-4651-9568-54DB89D494C1}" type="datetimeFigureOut">
               <a:rPr lang="pt-PT" smtClean="0"/>
-              <a:t>11/04/2014</a:t>
+              <a:t>15/04/2014</a:t>
             </a:fld>
             <a:endParaRPr lang="pt-PT"/>
           </a:p>
@@ -2382,7 +2382,7 @@
           <a:p>
             <a:fld id="{8A106747-A151-4651-9568-54DB89D494C1}" type="datetimeFigureOut">
               <a:rPr lang="pt-PT" smtClean="0"/>
-              <a:t>11/04/2014</a:t>
+              <a:t>15/04/2014</a:t>
             </a:fld>
             <a:endParaRPr lang="pt-PT"/>
           </a:p>
@@ -2595,7 +2595,7 @@
           <a:p>
             <a:fld id="{8A106747-A151-4651-9568-54DB89D494C1}" type="datetimeFigureOut">
               <a:rPr lang="pt-PT" smtClean="0"/>
-              <a:t>11/04/2014</a:t>
+              <a:t>15/04/2014</a:t>
             </a:fld>
             <a:endParaRPr lang="pt-PT"/>
           </a:p>
@@ -3242,26 +3242,6 @@
               </a:rPr>
               <a:t>Letrinhas 0.3</a:t>
             </a:r>
-            <a:endParaRPr lang="pt-PT" sz="5400" b="1" cap="none" spc="50" dirty="0" smtClean="0">
-              <a:ln w="9525" cmpd="sng">
-                <a:solidFill>
-                  <a:schemeClr val="accent1"/>
-                </a:solidFill>
-                <a:prstDash val="solid"/>
-              </a:ln>
-              <a:solidFill>
-                <a:srgbClr val="70AD47">
-                  <a:tint val="1000"/>
-                </a:srgbClr>
-              </a:solidFill>
-              <a:effectLst>
-                <a:glow rad="38100">
-                  <a:schemeClr val="accent1">
-                    <a:alpha val="40000"/>
-                  </a:schemeClr>
-                </a:glow>
-              </a:effectLst>
-            </a:endParaRPr>
           </a:p>
           <a:p>
             <a:pPr algn="ctr"/>
@@ -3683,7 +3663,7 @@
         </p:blipFill>
         <p:spPr>
           <a:xfrm>
-            <a:off x="8791310" y="4992092"/>
+            <a:off x="8843835" y="4992091"/>
             <a:ext cx="733260" cy="733260"/>
           </a:xfrm>
           <a:prstGeom prst="rect">
@@ -3937,7 +3917,7 @@
         <p:spPr>
           <a:xfrm>
             <a:off x="2321895" y="2332375"/>
-            <a:ext cx="6259133" cy="3349060"/>
+            <a:ext cx="4555405" cy="3349060"/>
           </a:xfrm>
           <a:prstGeom prst="rect">
             <a:avLst/>
@@ -3974,36 +3954,6 @@
           </a:p>
         </p:txBody>
       </p:sp>
-      <p:pic>
-        <p:nvPicPr>
-          <p:cNvPr id="29" name="Imagem 28"/>
-          <p:cNvPicPr>
-            <a:picLocks noChangeAspect="1"/>
-          </p:cNvPicPr>
-          <p:nvPr/>
-        </p:nvPicPr>
-        <p:blipFill>
-          <a:blip r:embed="rId6" cstate="print">
-            <a:extLst>
-              <a:ext uri="{28A0092B-C50C-407E-A947-70E740481C1C}">
-                <a14:useLocalDpi xmlns:a14="http://schemas.microsoft.com/office/drawing/2010/main" val="0"/>
-              </a:ext>
-            </a:extLst>
-          </a:blip>
-          <a:stretch>
-            <a:fillRect/>
-          </a:stretch>
-        </p:blipFill>
-        <p:spPr>
-          <a:xfrm>
-            <a:off x="8704254" y="4062014"/>
-            <a:ext cx="930078" cy="930078"/>
-          </a:xfrm>
-          <a:prstGeom prst="rect">
-            <a:avLst/>
-          </a:prstGeom>
-        </p:spPr>
-      </p:pic>
       <p:sp>
         <p:nvSpPr>
           <p:cNvPr id="41" name="Retângulo 40"/>
@@ -4013,7 +3963,7 @@
         <p:spPr>
           <a:xfrm>
             <a:off x="2294500" y="2370258"/>
-            <a:ext cx="6437424" cy="3416320"/>
+            <a:ext cx="4582800" cy="3139321"/>
           </a:xfrm>
           <a:prstGeom prst="rect">
             <a:avLst/>
@@ -4182,11 +4132,32 @@
                   </a:glow>
                 </a:effectLst>
               </a:rPr>
-              <a:t> nesse tal lugar, que uma vida não chega para lá chegar.</a:t>
-            </a:r>
-          </a:p>
-          <a:p>
-            <a:endParaRPr lang="pt-PT" b="1" spc="50" dirty="0">
+              <a:t> nesse tal lugar, que uma vida não chega para lá </a:t>
+            </a:r>
+            <a:r>
+              <a:rPr lang="pt-PT" b="1" spc="50" dirty="0" smtClean="0">
+                <a:ln w="9525" cmpd="sng">
+                  <a:solidFill>
+                    <a:schemeClr val="accent1"/>
+                  </a:solidFill>
+                  <a:prstDash val="solid"/>
+                </a:ln>
+                <a:solidFill>
+                  <a:srgbClr val="70AD47">
+                    <a:tint val="1000"/>
+                  </a:srgbClr>
+                </a:solidFill>
+                <a:effectLst>
+                  <a:glow rad="38100">
+                    <a:schemeClr val="accent1">
+                      <a:alpha val="40000"/>
+                    </a:schemeClr>
+                  </a:glow>
+                </a:effectLst>
+              </a:rPr>
+              <a:t>chegar.</a:t>
+            </a:r>
+            <a:endParaRPr lang="pt-PT" i="1" u="sng" cap="none" spc="50" dirty="0">
               <a:ln w="9525" cmpd="sng">
                 <a:solidFill>
                   <a:schemeClr val="accent1"/>
@@ -4207,56 +4178,35 @@
               </a:effectLst>
             </a:endParaRPr>
           </a:p>
-          <a:p>
-            <a:r>
-              <a:rPr lang="pt-PT" b="1" spc="50" dirty="0" smtClean="0">
-                <a:ln w="9525" cmpd="sng">
-                  <a:solidFill>
-                    <a:schemeClr val="accent1"/>
-                  </a:solidFill>
-                  <a:prstDash val="solid"/>
-                </a:ln>
-                <a:solidFill>
-                  <a:srgbClr val="70AD47">
-                    <a:tint val="1000"/>
-                  </a:srgbClr>
-                </a:solidFill>
-                <a:effectLst>
-                  <a:glow rad="38100">
-                    <a:schemeClr val="accent1">
-                      <a:alpha val="40000"/>
-                    </a:schemeClr>
-                  </a:glow>
-                </a:effectLst>
-              </a:rPr>
-              <a:t>	Há os que pensam que só a encontramos se não a procurarmos. Nem pensarmos nisso. E os que estão convencidos de que é preciso procura-la sem cessar. Por isso  </a:t>
-            </a:r>
-            <a:endParaRPr lang="pt-PT" i="1" u="sng" cap="none" spc="50" dirty="0">
-              <a:ln w="9525" cmpd="sng">
-                <a:solidFill>
-                  <a:schemeClr val="accent1"/>
-                </a:solidFill>
-                <a:prstDash val="solid"/>
-              </a:ln>
-              <a:solidFill>
-                <a:srgbClr val="70AD47">
-                  <a:tint val="1000"/>
-                </a:srgbClr>
-              </a:solidFill>
-              <a:effectLst>
-                <a:glow rad="38100">
-                  <a:schemeClr val="accent1">
-                    <a:alpha val="40000"/>
-                  </a:schemeClr>
-                </a:glow>
-              </a:effectLst>
-            </a:endParaRPr>
-          </a:p>
         </p:txBody>
       </p:sp>
       <p:pic>
         <p:nvPicPr>
-          <p:cNvPr id="42" name="Imagem 41"/>
+          <p:cNvPr id="5" name="Imagem 4"/>
+          <p:cNvPicPr>
+            <a:picLocks noChangeAspect="1"/>
+          </p:cNvPicPr>
+          <p:nvPr/>
+        </p:nvPicPr>
+        <p:blipFill>
+          <a:blip r:embed="rId6"/>
+          <a:stretch>
+            <a:fillRect/>
+          </a:stretch>
+        </p:blipFill>
+        <p:spPr>
+          <a:xfrm>
+            <a:off x="8681548" y="1057001"/>
+            <a:ext cx="981075" cy="476250"/>
+          </a:xfrm>
+          <a:prstGeom prst="rect">
+            <a:avLst/>
+          </a:prstGeom>
+        </p:spPr>
+      </p:pic>
+      <p:pic>
+        <p:nvPicPr>
+          <p:cNvPr id="6" name="Imagem 5"/>
           <p:cNvPicPr>
             <a:picLocks noChangeAspect="1"/>
           </p:cNvPicPr>
@@ -4275,9 +4225,9 @@
           </a:stretch>
         </p:blipFill>
         <p:spPr>
-          <a:xfrm rot="10800000">
-            <a:off x="8706524" y="3242891"/>
-            <a:ext cx="914676" cy="914676"/>
+          <a:xfrm>
+            <a:off x="8763714" y="2444027"/>
+            <a:ext cx="788452" cy="788452"/>
           </a:xfrm>
           <a:prstGeom prst="rect">
             <a:avLst/>
@@ -4286,22 +4236,28 @@
       </p:pic>
       <p:pic>
         <p:nvPicPr>
-          <p:cNvPr id="5" name="Imagem 4"/>
+          <p:cNvPr id="4" name="Imagem 3"/>
           <p:cNvPicPr>
             <a:picLocks noChangeAspect="1"/>
           </p:cNvPicPr>
           <p:nvPr/>
         </p:nvPicPr>
         <p:blipFill>
-          <a:blip r:embed="rId8"/>
+          <a:blip r:embed="rId8" cstate="print">
+            <a:extLst>
+              <a:ext uri="{28A0092B-C50C-407E-A947-70E740481C1C}">
+                <a14:useLocalDpi xmlns:a14="http://schemas.microsoft.com/office/drawing/2010/main" val="0"/>
+              </a:ext>
+            </a:extLst>
+          </a:blip>
           <a:stretch>
             <a:fillRect/>
           </a:stretch>
         </p:blipFill>
         <p:spPr>
           <a:xfrm>
-            <a:off x="8681548" y="1057001"/>
-            <a:ext cx="981075" cy="476250"/>
+            <a:off x="8788211" y="1621846"/>
+            <a:ext cx="784288" cy="784288"/>
           </a:xfrm>
           <a:prstGeom prst="rect">
             <a:avLst/>
@@ -4310,7 +4266,7 @@
       </p:pic>
       <p:pic>
         <p:nvPicPr>
-          <p:cNvPr id="6" name="Imagem 5"/>
+          <p:cNvPr id="22" name="Imagem 21"/>
           <p:cNvPicPr>
             <a:picLocks noChangeAspect="1"/>
           </p:cNvPicPr>
@@ -4330,17 +4286,124 @@
         </p:blipFill>
         <p:spPr>
           <a:xfrm>
-            <a:off x="8753210" y="2456370"/>
-            <a:ext cx="788452" cy="788452"/>
+            <a:off x="4135565" y="4696988"/>
+            <a:ext cx="1315896" cy="1315896"/>
           </a:xfrm>
           <a:prstGeom prst="rect">
             <a:avLst/>
           </a:prstGeom>
         </p:spPr>
       </p:pic>
+      <p:sp>
+        <p:nvSpPr>
+          <p:cNvPr id="10" name="Retângulo 9"/>
+          <p:cNvSpPr/>
+          <p:nvPr/>
+        </p:nvSpPr>
+        <p:spPr>
+          <a:xfrm>
+            <a:off x="7146636" y="2332374"/>
+            <a:ext cx="1427863" cy="3392977"/>
+          </a:xfrm>
+          <a:prstGeom prst="rect">
+            <a:avLst/>
+          </a:prstGeom>
+          <a:solidFill>
+            <a:srgbClr val="0070C0"/>
+          </a:solidFill>
+        </p:spPr>
+        <p:style>
+          <a:lnRef idx="2">
+            <a:schemeClr val="accent1">
+              <a:shade val="50000"/>
+            </a:schemeClr>
+          </a:lnRef>
+          <a:fillRef idx="1">
+            <a:schemeClr val="accent1"/>
+          </a:fillRef>
+          <a:effectRef idx="0">
+            <a:schemeClr val="accent1"/>
+          </a:effectRef>
+          <a:fontRef idx="minor">
+            <a:schemeClr val="lt1"/>
+          </a:fontRef>
+        </p:style>
+        <p:txBody>
+          <a:bodyPr rtlCol="0" anchor="ctr"/>
+          <a:lstStyle/>
+          <a:p>
+            <a:pPr algn="ctr"/>
+            <a:r>
+              <a:rPr lang="pt-PT" sz="1400" dirty="0" smtClean="0"/>
+              <a:t>Vacilações</a:t>
+            </a:r>
+          </a:p>
+          <a:p>
+            <a:pPr algn="ctr"/>
+            <a:endParaRPr lang="pt-PT" dirty="0" smtClean="0"/>
+          </a:p>
+          <a:p>
+            <a:pPr algn="ctr"/>
+            <a:endParaRPr lang="pt-PT" dirty="0"/>
+          </a:p>
+          <a:p>
+            <a:pPr algn="ctr"/>
+            <a:r>
+              <a:rPr lang="pt-PT" sz="1400" dirty="0" smtClean="0"/>
+              <a:t>Fragmentações</a:t>
+            </a:r>
+          </a:p>
+          <a:p>
+            <a:pPr algn="ctr"/>
+            <a:endParaRPr lang="pt-PT" sz="1400" dirty="0" smtClean="0"/>
+          </a:p>
+          <a:p>
+            <a:pPr algn="ctr"/>
+            <a:endParaRPr lang="pt-PT" sz="1400" dirty="0" smtClean="0"/>
+          </a:p>
+          <a:p>
+            <a:pPr algn="ctr"/>
+            <a:endParaRPr lang="pt-PT" sz="1400" dirty="0"/>
+          </a:p>
+          <a:p>
+            <a:pPr algn="ctr"/>
+            <a:r>
+              <a:rPr lang="pt-PT" sz="1400" dirty="0" smtClean="0"/>
+              <a:t>Silabações</a:t>
+            </a:r>
+          </a:p>
+          <a:p>
+            <a:pPr algn="ctr"/>
+            <a:endParaRPr lang="pt-PT" sz="1400" dirty="0" smtClean="0"/>
+          </a:p>
+          <a:p>
+            <a:pPr algn="ctr"/>
+            <a:endParaRPr lang="pt-PT" sz="1400" dirty="0" smtClean="0"/>
+          </a:p>
+          <a:p>
+            <a:pPr algn="ctr"/>
+            <a:endParaRPr lang="pt-PT" sz="1400" dirty="0"/>
+          </a:p>
+          <a:p>
+            <a:pPr algn="ctr"/>
+            <a:r>
+              <a:rPr lang="pt-PT" sz="1400" dirty="0" smtClean="0"/>
+              <a:t>Repetições</a:t>
+            </a:r>
+          </a:p>
+          <a:p>
+            <a:pPr algn="ctr"/>
+            <a:endParaRPr lang="pt-PT" sz="1400" dirty="0"/>
+          </a:p>
+          <a:p>
+            <a:pPr algn="ctr"/>
+            <a:endParaRPr lang="pt-PT" sz="1400" dirty="0"/>
+          </a:p>
+        </p:txBody>
+      </p:sp>
       <p:pic>
         <p:nvPicPr>
-          <p:cNvPr id="4" name="Imagem 3"/>
+          <p:cNvPr id="13" name="Imagem 12"/>
           <p:cNvPicPr>
             <a:picLocks noChangeAspect="1"/>
           </p:cNvPicPr>
@@ -4360,8 +4423,8 @@
         </p:blipFill>
         <p:spPr>
           <a:xfrm>
-            <a:off x="8788211" y="1621846"/>
-            <a:ext cx="784288" cy="784288"/>
+            <a:off x="7909915" y="2684648"/>
+            <a:ext cx="586186" cy="586186"/>
           </a:xfrm>
           <a:prstGeom prst="rect">
             <a:avLst/>
@@ -4370,7 +4433,7 @@
       </p:pic>
       <p:pic>
         <p:nvPicPr>
-          <p:cNvPr id="22" name="Imagem 21"/>
+          <p:cNvPr id="14" name="Imagem 13"/>
           <p:cNvPicPr>
             <a:picLocks noChangeAspect="1"/>
           </p:cNvPicPr>
@@ -4390,8 +4453,248 @@
         </p:blipFill>
         <p:spPr>
           <a:xfrm>
-            <a:off x="6353439" y="3869105"/>
-            <a:ext cx="1315896" cy="1315896"/>
+            <a:off x="7269019" y="2684648"/>
+            <a:ext cx="585725" cy="585725"/>
+          </a:xfrm>
+          <a:prstGeom prst="rect">
+            <a:avLst/>
+          </a:prstGeom>
+        </p:spPr>
+      </p:pic>
+      <p:pic>
+        <p:nvPicPr>
+          <p:cNvPr id="24" name="Imagem 23"/>
+          <p:cNvPicPr>
+            <a:picLocks noChangeAspect="1"/>
+          </p:cNvPicPr>
+          <p:nvPr/>
+        </p:nvPicPr>
+        <p:blipFill>
+          <a:blip r:embed="rId11" cstate="print">
+            <a:extLst>
+              <a:ext uri="{28A0092B-C50C-407E-A947-70E740481C1C}">
+                <a14:useLocalDpi xmlns:a14="http://schemas.microsoft.com/office/drawing/2010/main" val="0"/>
+              </a:ext>
+            </a:extLst>
+          </a:blip>
+          <a:stretch>
+            <a:fillRect/>
+          </a:stretch>
+        </p:blipFill>
+        <p:spPr>
+          <a:xfrm>
+            <a:off x="7270403" y="3476289"/>
+            <a:ext cx="585725" cy="585725"/>
+          </a:xfrm>
+          <a:prstGeom prst="rect">
+            <a:avLst/>
+          </a:prstGeom>
+        </p:spPr>
+      </p:pic>
+      <p:pic>
+        <p:nvPicPr>
+          <p:cNvPr id="25" name="Imagem 24"/>
+          <p:cNvPicPr>
+            <a:picLocks noChangeAspect="1"/>
+          </p:cNvPicPr>
+          <p:nvPr/>
+        </p:nvPicPr>
+        <p:blipFill>
+          <a:blip r:embed="rId11" cstate="print">
+            <a:extLst>
+              <a:ext uri="{28A0092B-C50C-407E-A947-70E740481C1C}">
+                <a14:useLocalDpi xmlns:a14="http://schemas.microsoft.com/office/drawing/2010/main" val="0"/>
+              </a:ext>
+            </a:extLst>
+          </a:blip>
+          <a:stretch>
+            <a:fillRect/>
+          </a:stretch>
+        </p:blipFill>
+        <p:spPr>
+          <a:xfrm>
+            <a:off x="7261068" y="4307727"/>
+            <a:ext cx="585725" cy="585725"/>
+          </a:xfrm>
+          <a:prstGeom prst="rect">
+            <a:avLst/>
+          </a:prstGeom>
+        </p:spPr>
+      </p:pic>
+      <p:pic>
+        <p:nvPicPr>
+          <p:cNvPr id="26" name="Imagem 25"/>
+          <p:cNvPicPr>
+            <a:picLocks noChangeAspect="1"/>
+          </p:cNvPicPr>
+          <p:nvPr/>
+        </p:nvPicPr>
+        <p:blipFill>
+          <a:blip r:embed="rId11" cstate="print">
+            <a:extLst>
+              <a:ext uri="{28A0092B-C50C-407E-A947-70E740481C1C}">
+                <a14:useLocalDpi xmlns:a14="http://schemas.microsoft.com/office/drawing/2010/main" val="0"/>
+              </a:ext>
+            </a:extLst>
+          </a:blip>
+          <a:stretch>
+            <a:fillRect/>
+          </a:stretch>
+        </p:blipFill>
+        <p:spPr>
+          <a:xfrm>
+            <a:off x="7261068" y="5139626"/>
+            <a:ext cx="585725" cy="585725"/>
+          </a:xfrm>
+          <a:prstGeom prst="rect">
+            <a:avLst/>
+          </a:prstGeom>
+        </p:spPr>
+      </p:pic>
+      <p:pic>
+        <p:nvPicPr>
+          <p:cNvPr id="27" name="Imagem 26"/>
+          <p:cNvPicPr>
+            <a:picLocks noChangeAspect="1"/>
+          </p:cNvPicPr>
+          <p:nvPr/>
+        </p:nvPicPr>
+        <p:blipFill>
+          <a:blip r:embed="rId10" cstate="print">
+            <a:extLst>
+              <a:ext uri="{28A0092B-C50C-407E-A947-70E740481C1C}">
+                <a14:useLocalDpi xmlns:a14="http://schemas.microsoft.com/office/drawing/2010/main" val="0"/>
+              </a:ext>
+            </a:extLst>
+          </a:blip>
+          <a:stretch>
+            <a:fillRect/>
+          </a:stretch>
+        </p:blipFill>
+        <p:spPr>
+          <a:xfrm>
+            <a:off x="7917554" y="3476289"/>
+            <a:ext cx="586186" cy="586186"/>
+          </a:xfrm>
+          <a:prstGeom prst="rect">
+            <a:avLst/>
+          </a:prstGeom>
+        </p:spPr>
+      </p:pic>
+      <p:pic>
+        <p:nvPicPr>
+          <p:cNvPr id="30" name="Imagem 29"/>
+          <p:cNvPicPr>
+            <a:picLocks noChangeAspect="1"/>
+          </p:cNvPicPr>
+          <p:nvPr/>
+        </p:nvPicPr>
+        <p:blipFill>
+          <a:blip r:embed="rId10" cstate="print">
+            <a:extLst>
+              <a:ext uri="{28A0092B-C50C-407E-A947-70E740481C1C}">
+                <a14:useLocalDpi xmlns:a14="http://schemas.microsoft.com/office/drawing/2010/main" val="0"/>
+              </a:ext>
+            </a:extLst>
+          </a:blip>
+          <a:stretch>
+            <a:fillRect/>
+          </a:stretch>
+        </p:blipFill>
+        <p:spPr>
+          <a:xfrm>
+            <a:off x="7919023" y="4307727"/>
+            <a:ext cx="586186" cy="586186"/>
+          </a:xfrm>
+          <a:prstGeom prst="rect">
+            <a:avLst/>
+          </a:prstGeom>
+        </p:spPr>
+      </p:pic>
+      <p:pic>
+        <p:nvPicPr>
+          <p:cNvPr id="31" name="Imagem 30"/>
+          <p:cNvPicPr>
+            <a:picLocks noChangeAspect="1"/>
+          </p:cNvPicPr>
+          <p:nvPr/>
+        </p:nvPicPr>
+        <p:blipFill>
+          <a:blip r:embed="rId10" cstate="print">
+            <a:extLst>
+              <a:ext uri="{28A0092B-C50C-407E-A947-70E740481C1C}">
+                <a14:useLocalDpi xmlns:a14="http://schemas.microsoft.com/office/drawing/2010/main" val="0"/>
+              </a:ext>
+            </a:extLst>
+          </a:blip>
+          <a:stretch>
+            <a:fillRect/>
+          </a:stretch>
+        </p:blipFill>
+        <p:spPr>
+          <a:xfrm>
+            <a:off x="7909915" y="5139165"/>
+            <a:ext cx="586186" cy="586186"/>
+          </a:xfrm>
+          <a:prstGeom prst="rect">
+            <a:avLst/>
+          </a:prstGeom>
+        </p:spPr>
+      </p:pic>
+      <p:pic>
+        <p:nvPicPr>
+          <p:cNvPr id="15" name="Imagem 14"/>
+          <p:cNvPicPr>
+            <a:picLocks noChangeAspect="1"/>
+          </p:cNvPicPr>
+          <p:nvPr/>
+        </p:nvPicPr>
+        <p:blipFill>
+          <a:blip r:embed="rId12" cstate="print">
+            <a:extLst>
+              <a:ext uri="{28A0092B-C50C-407E-A947-70E740481C1C}">
+                <a14:useLocalDpi xmlns:a14="http://schemas.microsoft.com/office/drawing/2010/main" val="0"/>
+              </a:ext>
+            </a:extLst>
+          </a:blip>
+          <a:stretch>
+            <a:fillRect/>
+          </a:stretch>
+        </p:blipFill>
+        <p:spPr>
+          <a:xfrm>
+            <a:off x="8818688" y="3378912"/>
+            <a:ext cx="683102" cy="683102"/>
+          </a:xfrm>
+          <a:prstGeom prst="rect">
+            <a:avLst/>
+          </a:prstGeom>
+        </p:spPr>
+      </p:pic>
+      <p:pic>
+        <p:nvPicPr>
+          <p:cNvPr id="16" name="Imagem 15"/>
+          <p:cNvPicPr>
+            <a:picLocks noChangeAspect="1"/>
+          </p:cNvPicPr>
+          <p:nvPr/>
+        </p:nvPicPr>
+        <p:blipFill>
+          <a:blip r:embed="rId13" cstate="print">
+            <a:extLst>
+              <a:ext uri="{28A0092B-C50C-407E-A947-70E740481C1C}">
+                <a14:useLocalDpi xmlns:a14="http://schemas.microsoft.com/office/drawing/2010/main" val="0"/>
+              </a:ext>
+            </a:extLst>
+          </a:blip>
+          <a:stretch>
+            <a:fillRect/>
+          </a:stretch>
+        </p:blipFill>
+        <p:spPr>
+          <a:xfrm>
+            <a:off x="8805589" y="4203937"/>
+            <a:ext cx="754210" cy="754210"/>
           </a:xfrm>
           <a:prstGeom prst="rect">
             <a:avLst/>
@@ -6079,30 +6382,7 @@
                   </a:glow>
                 </a:effectLst>
               </a:rPr>
-              <a:t>Teste 1: </a:t>
-            </a:r>
-            <a:r>
-              <a:rPr lang="pt-PT" sz="2000" b="1" cap="none" spc="50" dirty="0" smtClean="0">
-                <a:ln w="9525" cmpd="sng">
-                  <a:solidFill>
-                    <a:schemeClr val="accent1"/>
-                  </a:solidFill>
-                  <a:prstDash val="solid"/>
-                </a:ln>
-                <a:solidFill>
-                  <a:srgbClr val="70AD47">
-                    <a:tint val="1000"/>
-                  </a:srgbClr>
-                </a:solidFill>
-                <a:effectLst>
-                  <a:glow rad="38100">
-                    <a:schemeClr val="accent1">
-                      <a:alpha val="40000"/>
-                    </a:schemeClr>
-                  </a:glow>
-                </a:effectLst>
-              </a:rPr>
-              <a:t>Numeração Romana</a:t>
+              <a:t>Teste 1: Numeração Romana</a:t>
             </a:r>
             <a:endParaRPr lang="pt-PT" sz="2000" i="1" u="sng" cap="none" spc="50" dirty="0">
               <a:ln w="9525" cmpd="sng">
@@ -6170,30 +6450,7 @@
                   </a:glow>
                 </a:effectLst>
               </a:rPr>
-              <a:t>Teste </a:t>
-            </a:r>
-            <a:r>
-              <a:rPr lang="pt-PT" sz="2000" b="1" cap="none" spc="50" dirty="0" smtClean="0">
-                <a:ln w="9525" cmpd="sng">
-                  <a:solidFill>
-                    <a:schemeClr val="accent1"/>
-                  </a:solidFill>
-                  <a:prstDash val="solid"/>
-                </a:ln>
-                <a:solidFill>
-                  <a:srgbClr val="70AD47">
-                    <a:tint val="1000"/>
-                  </a:srgbClr>
-                </a:solidFill>
-                <a:effectLst>
-                  <a:glow rad="38100">
-                    <a:schemeClr val="accent1">
-                      <a:alpha val="40000"/>
-                    </a:schemeClr>
-                  </a:glow>
-                </a:effectLst>
-              </a:rPr>
-              <a:t>2: Fracionários</a:t>
+              <a:t>Teste 2: Fracionários</a:t>
             </a:r>
             <a:endParaRPr lang="pt-PT" sz="2000" i="1" u="sng" cap="none" spc="50" dirty="0">
               <a:ln w="9525" cmpd="sng">
@@ -6261,30 +6518,7 @@
                   </a:glow>
                 </a:effectLst>
               </a:rPr>
-              <a:t>Teste 3</a:t>
-            </a:r>
-            <a:r>
-              <a:rPr lang="pt-PT" sz="2000" b="1" cap="none" spc="50" dirty="0" smtClean="0">
-                <a:ln w="9525" cmpd="sng">
-                  <a:solidFill>
-                    <a:schemeClr val="accent1"/>
-                  </a:solidFill>
-                  <a:prstDash val="solid"/>
-                </a:ln>
-                <a:solidFill>
-                  <a:srgbClr val="70AD47">
-                    <a:tint val="1000"/>
-                  </a:srgbClr>
-                </a:solidFill>
-                <a:effectLst>
-                  <a:glow rad="38100">
-                    <a:schemeClr val="accent1">
-                      <a:alpha val="40000"/>
-                    </a:schemeClr>
-                  </a:glow>
-                </a:effectLst>
-              </a:rPr>
-              <a:t>: Numeração po</a:t>
+              <a:t>Teste 3: Numeração po</a:t>
             </a:r>
             <a:r>
               <a:rPr lang="pt-PT" sz="2000" b="1" spc="50" dirty="0" smtClean="0">
@@ -6984,30 +7218,7 @@
                   </a:glow>
                 </a:effectLst>
               </a:rPr>
-              <a:t>Teste 1: </a:t>
-            </a:r>
-            <a:r>
-              <a:rPr lang="pt-PT" b="1" spc="50" dirty="0" smtClean="0">
-                <a:ln w="9525" cmpd="sng">
-                  <a:solidFill>
-                    <a:schemeClr val="accent1"/>
-                  </a:solidFill>
-                  <a:prstDash val="solid"/>
-                </a:ln>
-                <a:solidFill>
-                  <a:srgbClr val="70AD47">
-                    <a:tint val="1000"/>
-                  </a:srgbClr>
-                </a:solidFill>
-                <a:effectLst>
-                  <a:glow rad="38100">
-                    <a:schemeClr val="accent1">
-                      <a:alpha val="40000"/>
-                    </a:schemeClr>
-                  </a:glow>
-                </a:effectLst>
-              </a:rPr>
-              <a:t>Numeração Romana</a:t>
+              <a:t>Teste 1: Numeração Romana</a:t>
             </a:r>
             <a:endParaRPr lang="pt-PT" i="1" u="sng" cap="none" spc="50" dirty="0">
               <a:ln w="9525" cmpd="sng">
@@ -7155,30 +7366,7 @@
                   </a:glow>
                 </a:effectLst>
               </a:rPr>
-              <a:t>	</a:t>
-            </a:r>
-            <a:r>
-              <a:rPr lang="pt-PT" b="1" spc="50" dirty="0" smtClean="0">
-                <a:ln w="9525" cmpd="sng">
-                  <a:solidFill>
-                    <a:schemeClr val="accent1"/>
-                  </a:solidFill>
-                  <a:prstDash val="solid"/>
-                </a:ln>
-                <a:solidFill>
-                  <a:srgbClr val="70AD47">
-                    <a:tint val="1000"/>
-                  </a:srgbClr>
-                </a:solidFill>
-                <a:effectLst>
-                  <a:glow rad="38100">
-                    <a:schemeClr val="accent1">
-                      <a:alpha val="40000"/>
-                    </a:schemeClr>
-                  </a:glow>
-                </a:effectLst>
-              </a:rPr>
-              <a:t> </a:t>
+              <a:t>	 </a:t>
             </a:r>
             <a:endParaRPr lang="pt-PT" i="1" u="sng" cap="none" spc="50" dirty="0">
               <a:ln w="9525" cmpd="sng">
@@ -7927,30 +8115,7 @@
                   </a:glow>
                 </a:effectLst>
               </a:rPr>
-              <a:t>Teste </a:t>
-            </a:r>
-            <a:r>
-              <a:rPr lang="pt-PT" b="1" spc="50" dirty="0" smtClean="0">
-                <a:ln w="9525" cmpd="sng">
-                  <a:solidFill>
-                    <a:schemeClr val="accent1"/>
-                  </a:solidFill>
-                  <a:prstDash val="solid"/>
-                </a:ln>
-                <a:solidFill>
-                  <a:srgbClr val="70AD47">
-                    <a:tint val="1000"/>
-                  </a:srgbClr>
-                </a:solidFill>
-                <a:effectLst>
-                  <a:glow rad="38100">
-                    <a:schemeClr val="accent1">
-                      <a:alpha val="40000"/>
-                    </a:schemeClr>
-                  </a:glow>
-                </a:effectLst>
-              </a:rPr>
-              <a:t>2: </a:t>
+              <a:t>Teste 2: </a:t>
             </a:r>
             <a:r>
               <a:rPr lang="pt-PT" b="1" spc="50" dirty="0" err="1" smtClean="0">
@@ -8117,30 +8282,7 @@
                   </a:glow>
                 </a:effectLst>
               </a:rPr>
-              <a:t>	</a:t>
-            </a:r>
-            <a:r>
-              <a:rPr lang="pt-PT" b="1" spc="50" dirty="0" smtClean="0">
-                <a:ln w="9525" cmpd="sng">
-                  <a:solidFill>
-                    <a:schemeClr val="accent1"/>
-                  </a:solidFill>
-                  <a:prstDash val="solid"/>
-                </a:ln>
-                <a:solidFill>
-                  <a:srgbClr val="70AD47">
-                    <a:tint val="1000"/>
-                  </a:srgbClr>
-                </a:solidFill>
-                <a:effectLst>
-                  <a:glow rad="38100">
-                    <a:schemeClr val="accent1">
-                      <a:alpha val="40000"/>
-                    </a:schemeClr>
-                  </a:glow>
-                </a:effectLst>
-              </a:rPr>
-              <a:t> </a:t>
+              <a:t>	 </a:t>
             </a:r>
             <a:endParaRPr lang="pt-PT" i="1" u="sng" cap="none" spc="50" dirty="0">
               <a:ln w="9525" cmpd="sng">
@@ -10216,30 +10358,7 @@
                   </a:glow>
                 </a:effectLst>
               </a:rPr>
-              <a:t>Teste 1: </a:t>
-            </a:r>
-            <a:r>
-              <a:rPr lang="pt-PT" sz="2000" b="1" cap="none" spc="50" dirty="0" smtClean="0">
-                <a:ln w="9525" cmpd="sng">
-                  <a:solidFill>
-                    <a:schemeClr val="accent1"/>
-                  </a:solidFill>
-                  <a:prstDash val="solid"/>
-                </a:ln>
-                <a:solidFill>
-                  <a:srgbClr val="70AD47">
-                    <a:tint val="1000"/>
-                  </a:srgbClr>
-                </a:solidFill>
-                <a:effectLst>
-                  <a:glow rad="38100">
-                    <a:schemeClr val="accent1">
-                      <a:alpha val="40000"/>
-                    </a:schemeClr>
-                  </a:glow>
-                </a:effectLst>
-              </a:rPr>
-              <a:t>Cores</a:t>
+              <a:t>Teste 1: Cores</a:t>
             </a:r>
             <a:endParaRPr lang="pt-PT" sz="2000" i="1" u="sng" cap="none" spc="50" dirty="0">
               <a:ln w="9525" cmpd="sng">
@@ -10307,30 +10426,7 @@
                   </a:glow>
                 </a:effectLst>
               </a:rPr>
-              <a:t>Teste </a:t>
-            </a:r>
-            <a:r>
-              <a:rPr lang="pt-PT" sz="2000" b="1" cap="none" spc="50" dirty="0" smtClean="0">
-                <a:ln w="9525" cmpd="sng">
-                  <a:solidFill>
-                    <a:schemeClr val="accent1"/>
-                  </a:solidFill>
-                  <a:prstDash val="solid"/>
-                </a:ln>
-                <a:solidFill>
-                  <a:srgbClr val="70AD47">
-                    <a:tint val="1000"/>
-                  </a:srgbClr>
-                </a:solidFill>
-                <a:effectLst>
-                  <a:glow rad="38100">
-                    <a:schemeClr val="accent1">
-                      <a:alpha val="40000"/>
-                    </a:schemeClr>
-                  </a:glow>
-                </a:effectLst>
-              </a:rPr>
-              <a:t>2: Estações do Ano</a:t>
+              <a:t>Teste 2: Estações do Ano</a:t>
             </a:r>
             <a:endParaRPr lang="pt-PT" sz="2000" i="1" u="sng" cap="none" spc="50" dirty="0">
               <a:ln w="9525" cmpd="sng">
@@ -11128,30 +11224,7 @@
                   </a:glow>
                 </a:effectLst>
               </a:rPr>
-              <a:t>	</a:t>
-            </a:r>
-            <a:r>
-              <a:rPr lang="pt-PT" b="1" spc="50" dirty="0" smtClean="0">
-                <a:ln w="9525" cmpd="sng">
-                  <a:solidFill>
-                    <a:schemeClr val="accent1"/>
-                  </a:solidFill>
-                  <a:prstDash val="solid"/>
-                </a:ln>
-                <a:solidFill>
-                  <a:srgbClr val="70AD47">
-                    <a:tint val="1000"/>
-                  </a:srgbClr>
-                </a:solidFill>
-                <a:effectLst>
-                  <a:glow rad="38100">
-                    <a:schemeClr val="accent1">
-                      <a:alpha val="40000"/>
-                    </a:schemeClr>
-                  </a:glow>
-                </a:effectLst>
-              </a:rPr>
-              <a:t> </a:t>
+              <a:t>	 </a:t>
             </a:r>
             <a:endParaRPr lang="pt-PT" i="1" u="sng" cap="none" spc="50" dirty="0">
               <a:ln w="9525" cmpd="sng">
@@ -15334,30 +15407,7 @@
                   </a:glow>
                 </a:effectLst>
               </a:rPr>
-              <a:t>Teste </a:t>
-            </a:r>
-            <a:r>
-              <a:rPr lang="pt-PT" sz="2000" b="1" cap="none" spc="50" dirty="0" smtClean="0">
-                <a:ln w="9525" cmpd="sng">
-                  <a:solidFill>
-                    <a:schemeClr val="accent1"/>
-                  </a:solidFill>
-                  <a:prstDash val="solid"/>
-                </a:ln>
-                <a:solidFill>
-                  <a:srgbClr val="70AD47">
-                    <a:tint val="1000"/>
-                  </a:srgbClr>
-                </a:solidFill>
-                <a:effectLst>
-                  <a:glow rad="38100">
-                    <a:schemeClr val="accent1">
-                      <a:alpha val="40000"/>
-                    </a:schemeClr>
-                  </a:glow>
-                </a:effectLst>
-              </a:rPr>
-              <a:t>2: a Galinha e o Gato</a:t>
+              <a:t>Teste 2: a Galinha e o Gato</a:t>
             </a:r>
             <a:endParaRPr lang="pt-PT" sz="2000" i="1" u="sng" cap="none" spc="50" dirty="0">
               <a:ln w="9525" cmpd="sng">
@@ -15425,30 +15475,7 @@
                   </a:glow>
                 </a:effectLst>
               </a:rPr>
-              <a:t>Teste 3</a:t>
-            </a:r>
-            <a:r>
-              <a:rPr lang="pt-PT" sz="2000" b="1" cap="none" spc="50" dirty="0" smtClean="0">
-                <a:ln w="9525" cmpd="sng">
-                  <a:solidFill>
-                    <a:schemeClr val="accent1"/>
-                  </a:solidFill>
-                  <a:prstDash val="solid"/>
-                </a:ln>
-                <a:solidFill>
-                  <a:srgbClr val="70AD47">
-                    <a:tint val="1000"/>
-                  </a:srgbClr>
-                </a:solidFill>
-                <a:effectLst>
-                  <a:glow rad="38100">
-                    <a:schemeClr val="accent1">
-                      <a:alpha val="40000"/>
-                    </a:schemeClr>
-                  </a:glow>
-                </a:effectLst>
-              </a:rPr>
-              <a:t>: Uma família de </a:t>
+              <a:t>Teste 3: Uma família de </a:t>
             </a:r>
             <a:r>
               <a:rPr lang="pt-PT" sz="2000" b="1" cap="none" spc="50" dirty="0" err="1" smtClean="0">
@@ -16103,7 +16130,7 @@
         </p:blipFill>
         <p:spPr>
           <a:xfrm>
-            <a:off x="8157623" y="1096219"/>
+            <a:off x="9214627" y="1031713"/>
             <a:ext cx="419705" cy="419705"/>
           </a:xfrm>
           <a:prstGeom prst="rect">
@@ -16178,30 +16205,7 @@
                   </a:glow>
                 </a:effectLst>
               </a:rPr>
-              <a:t>Teste 1: </a:t>
-            </a:r>
-            <a:r>
-              <a:rPr lang="pt-PT" b="1" spc="50" dirty="0" smtClean="0">
-                <a:ln w="9525" cmpd="sng">
-                  <a:solidFill>
-                    <a:schemeClr val="accent1"/>
-                  </a:solidFill>
-                  <a:prstDash val="solid"/>
-                </a:ln>
-                <a:solidFill>
-                  <a:srgbClr val="70AD47">
-                    <a:tint val="1000"/>
-                  </a:srgbClr>
-                </a:solidFill>
-                <a:effectLst>
-                  <a:glow rad="38100">
-                    <a:schemeClr val="accent1">
-                      <a:alpha val="40000"/>
-                    </a:schemeClr>
-                  </a:glow>
-                </a:effectLst>
-              </a:rPr>
-              <a:t>O menino</a:t>
+              <a:t>Teste 1: O menino</a:t>
             </a:r>
             <a:endParaRPr lang="pt-PT" i="1" u="sng" cap="none" spc="50" dirty="0">
               <a:ln w="9525" cmpd="sng">
@@ -16345,30 +16349,7 @@
                   </a:glow>
                 </a:effectLst>
               </a:rPr>
-              <a:t>	</a:t>
-            </a:r>
-            <a:r>
-              <a:rPr lang="pt-PT" b="1" spc="50" dirty="0" smtClean="0">
-                <a:ln w="9525" cmpd="sng">
-                  <a:solidFill>
-                    <a:schemeClr val="accent1"/>
-                  </a:solidFill>
-                  <a:prstDash val="solid"/>
-                </a:ln>
-                <a:solidFill>
-                  <a:srgbClr val="70AD47">
-                    <a:tint val="1000"/>
-                  </a:srgbClr>
-                </a:solidFill>
-                <a:effectLst>
-                  <a:glow rad="38100">
-                    <a:schemeClr val="accent1">
-                      <a:alpha val="40000"/>
-                    </a:schemeClr>
-                  </a:glow>
-                </a:effectLst>
-              </a:rPr>
-              <a:t>O menino estava feliz e contente…</a:t>
+              <a:t>	O menino estava feliz e contente…</a:t>
             </a:r>
             <a:endParaRPr lang="pt-PT" i="1" u="sng" cap="none" spc="50" dirty="0">
               <a:ln w="9525" cmpd="sng">
@@ -16425,30 +16406,6 @@
       </p:pic>
       <p:pic>
         <p:nvPicPr>
-          <p:cNvPr id="5" name="Imagem 4"/>
-          <p:cNvPicPr>
-            <a:picLocks noChangeAspect="1"/>
-          </p:cNvPicPr>
-          <p:nvPr/>
-        </p:nvPicPr>
-        <p:blipFill>
-          <a:blip r:embed="rId7"/>
-          <a:stretch>
-            <a:fillRect/>
-          </a:stretch>
-        </p:blipFill>
-        <p:spPr>
-          <a:xfrm>
-            <a:off x="8681548" y="1057001"/>
-            <a:ext cx="981075" cy="476250"/>
-          </a:xfrm>
-          <a:prstGeom prst="rect">
-            <a:avLst/>
-          </a:prstGeom>
-        </p:spPr>
-      </p:pic>
-      <p:pic>
-        <p:nvPicPr>
           <p:cNvPr id="6" name="Imagem 5"/>
           <p:cNvPicPr>
             <a:picLocks noChangeAspect="1"/>
@@ -16456,7 +16413,7 @@
           <p:nvPr/>
         </p:nvPicPr>
         <p:blipFill>
-          <a:blip r:embed="rId8" cstate="print">
+          <a:blip r:embed="rId7" cstate="print">
             <a:extLst>
               <a:ext uri="{28A0092B-C50C-407E-A947-70E740481C1C}">
                 <a14:useLocalDpi xmlns:a14="http://schemas.microsoft.com/office/drawing/2010/main" val="0"/>
@@ -16486,7 +16443,7 @@
           <p:nvPr/>
         </p:nvPicPr>
         <p:blipFill>
-          <a:blip r:embed="rId9"/>
+          <a:blip r:embed="rId8"/>
           <a:stretch>
             <a:fillRect/>
           </a:stretch>
@@ -16510,7 +16467,7 @@
           <p:nvPr/>
         </p:nvPicPr>
         <p:blipFill>
-          <a:blip r:embed="rId10"/>
+          <a:blip r:embed="rId9"/>
           <a:stretch>
             <a:fillRect/>
           </a:stretch>
@@ -16534,7 +16491,7 @@
           <p:nvPr/>
         </p:nvPicPr>
         <p:blipFill>
-          <a:blip r:embed="rId11"/>
+          <a:blip r:embed="rId10"/>
           <a:stretch>
             <a:fillRect/>
           </a:stretch>
@@ -23996,7 +23953,7 @@
         <p:spPr>
           <a:xfrm>
             <a:off x="2321895" y="2332375"/>
-            <a:ext cx="6259133" cy="3349060"/>
+            <a:ext cx="4602091" cy="3349060"/>
           </a:xfrm>
           <a:prstGeom prst="rect">
             <a:avLst/>
@@ -24033,36 +23990,6 @@
           </a:p>
         </p:txBody>
       </p:sp>
-      <p:pic>
-        <p:nvPicPr>
-          <p:cNvPr id="29" name="Imagem 28"/>
-          <p:cNvPicPr>
-            <a:picLocks noChangeAspect="1"/>
-          </p:cNvPicPr>
-          <p:nvPr/>
-        </p:nvPicPr>
-        <p:blipFill>
-          <a:blip r:embed="rId6" cstate="print">
-            <a:extLst>
-              <a:ext uri="{28A0092B-C50C-407E-A947-70E740481C1C}">
-                <a14:useLocalDpi xmlns:a14="http://schemas.microsoft.com/office/drawing/2010/main" val="0"/>
-              </a:ext>
-            </a:extLst>
-          </a:blip>
-          <a:stretch>
-            <a:fillRect/>
-          </a:stretch>
-        </p:blipFill>
-        <p:spPr>
-          <a:xfrm>
-            <a:off x="8704254" y="4062014"/>
-            <a:ext cx="930078" cy="930078"/>
-          </a:xfrm>
-          <a:prstGeom prst="rect">
-            <a:avLst/>
-          </a:prstGeom>
-        </p:spPr>
-      </p:pic>
       <p:sp>
         <p:nvSpPr>
           <p:cNvPr id="41" name="Retângulo 40"/>
@@ -24072,7 +23999,7 @@
         <p:spPr>
           <a:xfrm>
             <a:off x="2294500" y="2370258"/>
-            <a:ext cx="6437424" cy="3416320"/>
+            <a:ext cx="4582800" cy="3416320"/>
           </a:xfrm>
           <a:prstGeom prst="rect">
             <a:avLst/>
@@ -24157,7 +24084,7 @@
             </a:r>
           </a:p>
           <a:p>
-            <a:endParaRPr lang="pt-PT" b="1" spc="50" dirty="0">
+            <a:endParaRPr lang="pt-PT" i="1" u="sng" cap="none" spc="50" dirty="0">
               <a:ln w="9525" cmpd="sng">
                 <a:solidFill>
                   <a:schemeClr val="accent1"/>
@@ -24178,56 +24105,35 @@
               </a:effectLst>
             </a:endParaRPr>
           </a:p>
-          <a:p>
-            <a:r>
-              <a:rPr lang="pt-PT" b="1" spc="50" dirty="0" smtClean="0">
-                <a:ln w="9525" cmpd="sng">
-                  <a:solidFill>
-                    <a:schemeClr val="accent1"/>
-                  </a:solidFill>
-                  <a:prstDash val="solid"/>
-                </a:ln>
-                <a:solidFill>
-                  <a:srgbClr val="70AD47">
-                    <a:tint val="1000"/>
-                  </a:srgbClr>
-                </a:solidFill>
-                <a:effectLst>
-                  <a:glow rad="38100">
-                    <a:schemeClr val="accent1">
-                      <a:alpha val="40000"/>
-                    </a:schemeClr>
-                  </a:glow>
-                </a:effectLst>
-              </a:rPr>
-              <a:t>	Há os que pensam que só a encontramos se não a procurarmos. Nem pensarmos nisso. E os que estão convencidos de que é preciso procura-la sem cessar. Por isso  </a:t>
-            </a:r>
-            <a:endParaRPr lang="pt-PT" i="1" u="sng" cap="none" spc="50" dirty="0">
-              <a:ln w="9525" cmpd="sng">
-                <a:solidFill>
-                  <a:schemeClr val="accent1"/>
-                </a:solidFill>
-                <a:prstDash val="solid"/>
-              </a:ln>
-              <a:solidFill>
-                <a:srgbClr val="70AD47">
-                  <a:tint val="1000"/>
-                </a:srgbClr>
-              </a:solidFill>
-              <a:effectLst>
-                <a:glow rad="38100">
-                  <a:schemeClr val="accent1">
-                    <a:alpha val="40000"/>
-                  </a:schemeClr>
-                </a:glow>
-              </a:effectLst>
-            </a:endParaRPr>
-          </a:p>
         </p:txBody>
       </p:sp>
       <p:pic>
         <p:nvPicPr>
-          <p:cNvPr id="42" name="Imagem 41"/>
+          <p:cNvPr id="5" name="Imagem 4"/>
+          <p:cNvPicPr>
+            <a:picLocks noChangeAspect="1"/>
+          </p:cNvPicPr>
+          <p:nvPr/>
+        </p:nvPicPr>
+        <p:blipFill>
+          <a:blip r:embed="rId6"/>
+          <a:stretch>
+            <a:fillRect/>
+          </a:stretch>
+        </p:blipFill>
+        <p:spPr>
+          <a:xfrm>
+            <a:off x="8681548" y="1057001"/>
+            <a:ext cx="981075" cy="476250"/>
+          </a:xfrm>
+          <a:prstGeom prst="rect">
+            <a:avLst/>
+          </a:prstGeom>
+        </p:spPr>
+      </p:pic>
+      <p:pic>
+        <p:nvPicPr>
+          <p:cNvPr id="6" name="Imagem 5"/>
           <p:cNvPicPr>
             <a:picLocks noChangeAspect="1"/>
           </p:cNvPicPr>
@@ -24246,9 +24152,9 @@
           </a:stretch>
         </p:blipFill>
         <p:spPr>
-          <a:xfrm rot="10800000">
-            <a:off x="8706524" y="3242891"/>
-            <a:ext cx="914676" cy="914676"/>
+          <a:xfrm>
+            <a:off x="8753210" y="2456370"/>
+            <a:ext cx="788452" cy="788452"/>
           </a:xfrm>
           <a:prstGeom prst="rect">
             <a:avLst/>
@@ -24257,31 +24163,48 @@
       </p:pic>
       <p:pic>
         <p:nvPicPr>
-          <p:cNvPr id="5" name="Imagem 4"/>
+          <p:cNvPr id="1026" name="Picture 2" descr="http://www.iconki.com/icons/Web-development/128x128-webicons/rec.png"/>
           <p:cNvPicPr>
-            <a:picLocks noChangeAspect="1"/>
+            <a:picLocks noChangeAspect="1" noChangeArrowheads="1"/>
           </p:cNvPicPr>
           <p:nvPr/>
         </p:nvPicPr>
         <p:blipFill>
-          <a:blip r:embed="rId8"/>
+          <a:blip r:embed="rId8">
+            <a:extLst>
+              <a:ext uri="{28A0092B-C50C-407E-A947-70E740481C1C}">
+                <a14:useLocalDpi xmlns:a14="http://schemas.microsoft.com/office/drawing/2010/main" val="0"/>
+              </a:ext>
+            </a:extLst>
+          </a:blip>
+          <a:srcRect/>
           <a:stretch>
             <a:fillRect/>
           </a:stretch>
         </p:blipFill>
-        <p:spPr>
-          <a:xfrm>
-            <a:off x="8681548" y="1057001"/>
-            <a:ext cx="981075" cy="476250"/>
-          </a:xfrm>
-          <a:prstGeom prst="rect">
-            <a:avLst/>
-          </a:prstGeom>
+        <p:spPr bwMode="auto">
+          <a:xfrm>
+            <a:off x="8720128" y="1606516"/>
+            <a:ext cx="819182" cy="819183"/>
+          </a:xfrm>
+          <a:prstGeom prst="rect">
+            <a:avLst/>
+          </a:prstGeom>
+          <a:noFill/>
+          <a:extLst>
+            <a:ext uri="{909E8E84-426E-40DD-AFC4-6F175D3DCCD1}">
+              <a14:hiddenFill xmlns:a14="http://schemas.microsoft.com/office/drawing/2010/main">
+                <a:solidFill>
+                  <a:srgbClr val="FFFFFF"/>
+                </a:solidFill>
+              </a14:hiddenFill>
+            </a:ext>
+          </a:extLst>
         </p:spPr>
       </p:pic>
       <p:pic>
         <p:nvPicPr>
-          <p:cNvPr id="6" name="Imagem 5"/>
+          <p:cNvPr id="43" name="Imagem 42"/>
           <p:cNvPicPr>
             <a:picLocks noChangeAspect="1"/>
           </p:cNvPicPr>
@@ -24301,58 +24224,154 @@
         </p:blipFill>
         <p:spPr>
           <a:xfrm>
-            <a:off x="8753210" y="2456370"/>
-            <a:ext cx="788452" cy="788452"/>
+            <a:off x="8591436" y="1661884"/>
+            <a:ext cx="1315896" cy="1315896"/>
           </a:xfrm>
           <a:prstGeom prst="rect">
             <a:avLst/>
           </a:prstGeom>
         </p:spPr>
       </p:pic>
+      <p:sp>
+        <p:nvSpPr>
+          <p:cNvPr id="22" name="Retângulo 21"/>
+          <p:cNvSpPr/>
+          <p:nvPr/>
+        </p:nvSpPr>
+        <p:spPr>
+          <a:xfrm>
+            <a:off x="7146636" y="2332375"/>
+            <a:ext cx="1427863" cy="3349060"/>
+          </a:xfrm>
+          <a:prstGeom prst="rect">
+            <a:avLst/>
+          </a:prstGeom>
+          <a:solidFill>
+            <a:srgbClr val="0070C0"/>
+          </a:solidFill>
+        </p:spPr>
+        <p:style>
+          <a:lnRef idx="2">
+            <a:schemeClr val="accent1">
+              <a:shade val="50000"/>
+            </a:schemeClr>
+          </a:lnRef>
+          <a:fillRef idx="1">
+            <a:schemeClr val="accent1"/>
+          </a:fillRef>
+          <a:effectRef idx="0">
+            <a:schemeClr val="accent1"/>
+          </a:effectRef>
+          <a:fontRef idx="minor">
+            <a:schemeClr val="lt1"/>
+          </a:fontRef>
+        </p:style>
+        <p:txBody>
+          <a:bodyPr rtlCol="0" anchor="ctr"/>
+          <a:lstStyle/>
+          <a:p>
+            <a:pPr algn="ctr"/>
+            <a:r>
+              <a:rPr lang="pt-PT" sz="1400" dirty="0" smtClean="0"/>
+              <a:t>Vacilações</a:t>
+            </a:r>
+          </a:p>
+          <a:p>
+            <a:pPr algn="ctr"/>
+            <a:endParaRPr lang="pt-PT" dirty="0" smtClean="0"/>
+          </a:p>
+          <a:p>
+            <a:pPr algn="ctr"/>
+            <a:endParaRPr lang="pt-PT" dirty="0"/>
+          </a:p>
+          <a:p>
+            <a:pPr algn="ctr"/>
+            <a:r>
+              <a:rPr lang="pt-PT" sz="1400" dirty="0" smtClean="0"/>
+              <a:t>Fragmentações</a:t>
+            </a:r>
+          </a:p>
+          <a:p>
+            <a:pPr algn="ctr"/>
+            <a:endParaRPr lang="pt-PT" sz="1400" dirty="0" smtClean="0"/>
+          </a:p>
+          <a:p>
+            <a:pPr algn="ctr"/>
+            <a:endParaRPr lang="pt-PT" sz="1400" dirty="0" smtClean="0"/>
+          </a:p>
+          <a:p>
+            <a:pPr algn="ctr"/>
+            <a:endParaRPr lang="pt-PT" sz="1400" dirty="0"/>
+          </a:p>
+          <a:p>
+            <a:pPr algn="ctr"/>
+            <a:r>
+              <a:rPr lang="pt-PT" sz="1400" dirty="0" smtClean="0"/>
+              <a:t>Silabações</a:t>
+            </a:r>
+          </a:p>
+          <a:p>
+            <a:pPr algn="ctr"/>
+            <a:endParaRPr lang="pt-PT" sz="1400" dirty="0" smtClean="0"/>
+          </a:p>
+          <a:p>
+            <a:pPr algn="ctr"/>
+            <a:endParaRPr lang="pt-PT" sz="1400" dirty="0" smtClean="0"/>
+          </a:p>
+          <a:p>
+            <a:pPr algn="ctr"/>
+            <a:endParaRPr lang="pt-PT" sz="1400" dirty="0"/>
+          </a:p>
+          <a:p>
+            <a:pPr algn="ctr"/>
+            <a:r>
+              <a:rPr lang="pt-PT" sz="1400" dirty="0" smtClean="0"/>
+              <a:t>Repetições</a:t>
+            </a:r>
+          </a:p>
+          <a:p>
+            <a:pPr algn="ctr"/>
+            <a:endParaRPr lang="pt-PT" sz="1400" dirty="0"/>
+          </a:p>
+          <a:p>
+            <a:pPr algn="ctr"/>
+            <a:endParaRPr lang="pt-PT" sz="1400" dirty="0"/>
+          </a:p>
+        </p:txBody>
+      </p:sp>
       <p:pic>
         <p:nvPicPr>
-          <p:cNvPr id="1026" name="Picture 2" descr="http://www.iconki.com/icons/Web-development/128x128-webicons/rec.png"/>
+          <p:cNvPr id="24" name="Imagem 23"/>
           <p:cNvPicPr>
-            <a:picLocks noChangeAspect="1" noChangeArrowheads="1"/>
+            <a:picLocks noChangeAspect="1"/>
           </p:cNvPicPr>
           <p:nvPr/>
         </p:nvPicPr>
         <p:blipFill>
-          <a:blip r:embed="rId10">
+          <a:blip r:embed="rId10" cstate="print">
             <a:extLst>
               <a:ext uri="{28A0092B-C50C-407E-A947-70E740481C1C}">
                 <a14:useLocalDpi xmlns:a14="http://schemas.microsoft.com/office/drawing/2010/main" val="0"/>
               </a:ext>
             </a:extLst>
           </a:blip>
-          <a:srcRect/>
           <a:stretch>
             <a:fillRect/>
           </a:stretch>
         </p:blipFill>
-        <p:spPr bwMode="auto">
-          <a:xfrm>
-            <a:off x="8720128" y="1606516"/>
-            <a:ext cx="819182" cy="819183"/>
-          </a:xfrm>
-          <a:prstGeom prst="rect">
-            <a:avLst/>
-          </a:prstGeom>
-          <a:noFill/>
-          <a:extLst>
-            <a:ext uri="{909E8E84-426E-40DD-AFC4-6F175D3DCCD1}">
-              <a14:hiddenFill xmlns:a14="http://schemas.microsoft.com/office/drawing/2010/main">
-                <a:solidFill>
-                  <a:srgbClr val="FFFFFF"/>
-                </a:solidFill>
-              </a14:hiddenFill>
-            </a:ext>
-          </a:extLst>
+        <p:spPr>
+          <a:xfrm>
+            <a:off x="7909915" y="2658890"/>
+            <a:ext cx="586186" cy="586186"/>
+          </a:xfrm>
+          <a:prstGeom prst="rect">
+            <a:avLst/>
+          </a:prstGeom>
         </p:spPr>
       </p:pic>
       <p:pic>
         <p:nvPicPr>
-          <p:cNvPr id="43" name="Imagem 42"/>
+          <p:cNvPr id="25" name="Imagem 24"/>
           <p:cNvPicPr>
             <a:picLocks noChangeAspect="1"/>
           </p:cNvPicPr>
@@ -24372,8 +24391,248 @@
         </p:blipFill>
         <p:spPr>
           <a:xfrm>
-            <a:off x="8591436" y="1661884"/>
-            <a:ext cx="1315896" cy="1315896"/>
+            <a:off x="7269019" y="2658890"/>
+            <a:ext cx="585725" cy="585725"/>
+          </a:xfrm>
+          <a:prstGeom prst="rect">
+            <a:avLst/>
+          </a:prstGeom>
+        </p:spPr>
+      </p:pic>
+      <p:pic>
+        <p:nvPicPr>
+          <p:cNvPr id="26" name="Imagem 25"/>
+          <p:cNvPicPr>
+            <a:picLocks noChangeAspect="1"/>
+          </p:cNvPicPr>
+          <p:nvPr/>
+        </p:nvPicPr>
+        <p:blipFill>
+          <a:blip r:embed="rId11" cstate="print">
+            <a:extLst>
+              <a:ext uri="{28A0092B-C50C-407E-A947-70E740481C1C}">
+                <a14:useLocalDpi xmlns:a14="http://schemas.microsoft.com/office/drawing/2010/main" val="0"/>
+              </a:ext>
+            </a:extLst>
+          </a:blip>
+          <a:stretch>
+            <a:fillRect/>
+          </a:stretch>
+        </p:blipFill>
+        <p:spPr>
+          <a:xfrm>
+            <a:off x="7270403" y="3450531"/>
+            <a:ext cx="585725" cy="585725"/>
+          </a:xfrm>
+          <a:prstGeom prst="rect">
+            <a:avLst/>
+          </a:prstGeom>
+        </p:spPr>
+      </p:pic>
+      <p:pic>
+        <p:nvPicPr>
+          <p:cNvPr id="27" name="Imagem 26"/>
+          <p:cNvPicPr>
+            <a:picLocks noChangeAspect="1"/>
+          </p:cNvPicPr>
+          <p:nvPr/>
+        </p:nvPicPr>
+        <p:blipFill>
+          <a:blip r:embed="rId11" cstate="print">
+            <a:extLst>
+              <a:ext uri="{28A0092B-C50C-407E-A947-70E740481C1C}">
+                <a14:useLocalDpi xmlns:a14="http://schemas.microsoft.com/office/drawing/2010/main" val="0"/>
+              </a:ext>
+            </a:extLst>
+          </a:blip>
+          <a:stretch>
+            <a:fillRect/>
+          </a:stretch>
+        </p:blipFill>
+        <p:spPr>
+          <a:xfrm>
+            <a:off x="7261068" y="4281969"/>
+            <a:ext cx="585725" cy="585725"/>
+          </a:xfrm>
+          <a:prstGeom prst="rect">
+            <a:avLst/>
+          </a:prstGeom>
+        </p:spPr>
+      </p:pic>
+      <p:pic>
+        <p:nvPicPr>
+          <p:cNvPr id="30" name="Imagem 29"/>
+          <p:cNvPicPr>
+            <a:picLocks noChangeAspect="1"/>
+          </p:cNvPicPr>
+          <p:nvPr/>
+        </p:nvPicPr>
+        <p:blipFill>
+          <a:blip r:embed="rId11" cstate="print">
+            <a:extLst>
+              <a:ext uri="{28A0092B-C50C-407E-A947-70E740481C1C}">
+                <a14:useLocalDpi xmlns:a14="http://schemas.microsoft.com/office/drawing/2010/main" val="0"/>
+              </a:ext>
+            </a:extLst>
+          </a:blip>
+          <a:stretch>
+            <a:fillRect/>
+          </a:stretch>
+        </p:blipFill>
+        <p:spPr>
+          <a:xfrm>
+            <a:off x="7261068" y="5113868"/>
+            <a:ext cx="585725" cy="585725"/>
+          </a:xfrm>
+          <a:prstGeom prst="rect">
+            <a:avLst/>
+          </a:prstGeom>
+        </p:spPr>
+      </p:pic>
+      <p:pic>
+        <p:nvPicPr>
+          <p:cNvPr id="31" name="Imagem 30"/>
+          <p:cNvPicPr>
+            <a:picLocks noChangeAspect="1"/>
+          </p:cNvPicPr>
+          <p:nvPr/>
+        </p:nvPicPr>
+        <p:blipFill>
+          <a:blip r:embed="rId10" cstate="print">
+            <a:extLst>
+              <a:ext uri="{28A0092B-C50C-407E-A947-70E740481C1C}">
+                <a14:useLocalDpi xmlns:a14="http://schemas.microsoft.com/office/drawing/2010/main" val="0"/>
+              </a:ext>
+            </a:extLst>
+          </a:blip>
+          <a:stretch>
+            <a:fillRect/>
+          </a:stretch>
+        </p:blipFill>
+        <p:spPr>
+          <a:xfrm>
+            <a:off x="7917554" y="3450531"/>
+            <a:ext cx="586186" cy="586186"/>
+          </a:xfrm>
+          <a:prstGeom prst="rect">
+            <a:avLst/>
+          </a:prstGeom>
+        </p:spPr>
+      </p:pic>
+      <p:pic>
+        <p:nvPicPr>
+          <p:cNvPr id="32" name="Imagem 31"/>
+          <p:cNvPicPr>
+            <a:picLocks noChangeAspect="1"/>
+          </p:cNvPicPr>
+          <p:nvPr/>
+        </p:nvPicPr>
+        <p:blipFill>
+          <a:blip r:embed="rId10" cstate="print">
+            <a:extLst>
+              <a:ext uri="{28A0092B-C50C-407E-A947-70E740481C1C}">
+                <a14:useLocalDpi xmlns:a14="http://schemas.microsoft.com/office/drawing/2010/main" val="0"/>
+              </a:ext>
+            </a:extLst>
+          </a:blip>
+          <a:stretch>
+            <a:fillRect/>
+          </a:stretch>
+        </p:blipFill>
+        <p:spPr>
+          <a:xfrm>
+            <a:off x="7919023" y="4281969"/>
+            <a:ext cx="586186" cy="586186"/>
+          </a:xfrm>
+          <a:prstGeom prst="rect">
+            <a:avLst/>
+          </a:prstGeom>
+        </p:spPr>
+      </p:pic>
+      <p:pic>
+        <p:nvPicPr>
+          <p:cNvPr id="33" name="Imagem 32"/>
+          <p:cNvPicPr>
+            <a:picLocks noChangeAspect="1"/>
+          </p:cNvPicPr>
+          <p:nvPr/>
+        </p:nvPicPr>
+        <p:blipFill>
+          <a:blip r:embed="rId10" cstate="print">
+            <a:extLst>
+              <a:ext uri="{28A0092B-C50C-407E-A947-70E740481C1C}">
+                <a14:useLocalDpi xmlns:a14="http://schemas.microsoft.com/office/drawing/2010/main" val="0"/>
+              </a:ext>
+            </a:extLst>
+          </a:blip>
+          <a:stretch>
+            <a:fillRect/>
+          </a:stretch>
+        </p:blipFill>
+        <p:spPr>
+          <a:xfrm>
+            <a:off x="7909915" y="5113407"/>
+            <a:ext cx="586186" cy="586186"/>
+          </a:xfrm>
+          <a:prstGeom prst="rect">
+            <a:avLst/>
+          </a:prstGeom>
+        </p:spPr>
+      </p:pic>
+      <p:pic>
+        <p:nvPicPr>
+          <p:cNvPr id="34" name="Imagem 33"/>
+          <p:cNvPicPr>
+            <a:picLocks noChangeAspect="1"/>
+          </p:cNvPicPr>
+          <p:nvPr/>
+        </p:nvPicPr>
+        <p:blipFill>
+          <a:blip r:embed="rId12" cstate="print">
+            <a:extLst>
+              <a:ext uri="{28A0092B-C50C-407E-A947-70E740481C1C}">
+                <a14:useLocalDpi xmlns:a14="http://schemas.microsoft.com/office/drawing/2010/main" val="0"/>
+              </a:ext>
+            </a:extLst>
+          </a:blip>
+          <a:stretch>
+            <a:fillRect/>
+          </a:stretch>
+        </p:blipFill>
+        <p:spPr>
+          <a:xfrm>
+            <a:off x="8818688" y="3378912"/>
+            <a:ext cx="683102" cy="683102"/>
+          </a:xfrm>
+          <a:prstGeom prst="rect">
+            <a:avLst/>
+          </a:prstGeom>
+        </p:spPr>
+      </p:pic>
+      <p:pic>
+        <p:nvPicPr>
+          <p:cNvPr id="35" name="Imagem 34"/>
+          <p:cNvPicPr>
+            <a:picLocks noChangeAspect="1"/>
+          </p:cNvPicPr>
+          <p:nvPr/>
+        </p:nvPicPr>
+        <p:blipFill>
+          <a:blip r:embed="rId13" cstate="print">
+            <a:extLst>
+              <a:ext uri="{28A0092B-C50C-407E-A947-70E740481C1C}">
+                <a14:useLocalDpi xmlns:a14="http://schemas.microsoft.com/office/drawing/2010/main" val="0"/>
+              </a:ext>
+            </a:extLst>
+          </a:blip>
+          <a:stretch>
+            <a:fillRect/>
+          </a:stretch>
+        </p:blipFill>
+        <p:spPr>
+          <a:xfrm>
+            <a:off x="8805589" y="4203937"/>
+            <a:ext cx="754210" cy="754210"/>
           </a:xfrm>
           <a:prstGeom prst="rect">
             <a:avLst/>

</xml_diff>